<commit_message>
added some temp files for APG
</commit_message>
<xml_diff>
--- a/7_figures/figure_3.pptx
+++ b/7_figures/figure_3.pptx
@@ -107,6 +107,11 @@
       </a:defRPr>
     </a:lvl9pPr>
   </p:defaultTextStyle>
+  <p:extLst>
+    <p:ext uri="{EFAFB233-063F-42B5-8137-9DF3F51BA10A}">
+      <p15:sldGuideLst xmlns:p15="http://schemas.microsoft.com/office/powerpoint/2012/main"/>
+    </p:ext>
+  </p:extLst>
 </p:presentation>
 </file>
 
@@ -192,7 +197,7 @@
           <a:p>
             <a:fld id="{5423D7C1-6177-F347-981B-A0816949474E}" type="datetimeFigureOut">
               <a:rPr lang="en-US" smtClean="0"/>
-              <a:t>2/28/20</a:t>
+              <a:t>3/2/20</a:t>
             </a:fld>
             <a:endParaRPr lang="en-US"/>
           </a:p>
@@ -677,7 +682,7 @@
           <a:p>
             <a:fld id="{187C63FD-3E6A-F34B-BA3D-F39B9644396D}" type="datetimeFigureOut">
               <a:rPr lang="en-US" smtClean="0"/>
-              <a:t>2/28/20</a:t>
+              <a:t>3/2/20</a:t>
             </a:fld>
             <a:endParaRPr lang="en-US"/>
           </a:p>
@@ -847,7 +852,7 @@
           <a:p>
             <a:fld id="{187C63FD-3E6A-F34B-BA3D-F39B9644396D}" type="datetimeFigureOut">
               <a:rPr lang="en-US" smtClean="0"/>
-              <a:t>2/28/20</a:t>
+              <a:t>3/2/20</a:t>
             </a:fld>
             <a:endParaRPr lang="en-US"/>
           </a:p>
@@ -1027,7 +1032,7 @@
           <a:p>
             <a:fld id="{187C63FD-3E6A-F34B-BA3D-F39B9644396D}" type="datetimeFigureOut">
               <a:rPr lang="en-US" smtClean="0"/>
-              <a:t>2/28/20</a:t>
+              <a:t>3/2/20</a:t>
             </a:fld>
             <a:endParaRPr lang="en-US"/>
           </a:p>
@@ -1197,7 +1202,7 @@
           <a:p>
             <a:fld id="{187C63FD-3E6A-F34B-BA3D-F39B9644396D}" type="datetimeFigureOut">
               <a:rPr lang="en-US" smtClean="0"/>
-              <a:t>2/28/20</a:t>
+              <a:t>3/2/20</a:t>
             </a:fld>
             <a:endParaRPr lang="en-US"/>
           </a:p>
@@ -1441,7 +1446,7 @@
           <a:p>
             <a:fld id="{187C63FD-3E6A-F34B-BA3D-F39B9644396D}" type="datetimeFigureOut">
               <a:rPr lang="en-US" smtClean="0"/>
-              <a:t>2/28/20</a:t>
+              <a:t>3/2/20</a:t>
             </a:fld>
             <a:endParaRPr lang="en-US"/>
           </a:p>
@@ -1673,7 +1678,7 @@
           <a:p>
             <a:fld id="{187C63FD-3E6A-F34B-BA3D-F39B9644396D}" type="datetimeFigureOut">
               <a:rPr lang="en-US" smtClean="0"/>
-              <a:t>2/28/20</a:t>
+              <a:t>3/2/20</a:t>
             </a:fld>
             <a:endParaRPr lang="en-US"/>
           </a:p>
@@ -2040,7 +2045,7 @@
           <a:p>
             <a:fld id="{187C63FD-3E6A-F34B-BA3D-F39B9644396D}" type="datetimeFigureOut">
               <a:rPr lang="en-US" smtClean="0"/>
-              <a:t>2/28/20</a:t>
+              <a:t>3/2/20</a:t>
             </a:fld>
             <a:endParaRPr lang="en-US"/>
           </a:p>
@@ -2158,7 +2163,7 @@
           <a:p>
             <a:fld id="{187C63FD-3E6A-F34B-BA3D-F39B9644396D}" type="datetimeFigureOut">
               <a:rPr lang="en-US" smtClean="0"/>
-              <a:t>2/28/20</a:t>
+              <a:t>3/2/20</a:t>
             </a:fld>
             <a:endParaRPr lang="en-US"/>
           </a:p>
@@ -2253,7 +2258,7 @@
           <a:p>
             <a:fld id="{187C63FD-3E6A-F34B-BA3D-F39B9644396D}" type="datetimeFigureOut">
               <a:rPr lang="en-US" smtClean="0"/>
-              <a:t>2/28/20</a:t>
+              <a:t>3/2/20</a:t>
             </a:fld>
             <a:endParaRPr lang="en-US"/>
           </a:p>
@@ -2530,7 +2535,7 @@
           <a:p>
             <a:fld id="{187C63FD-3E6A-F34B-BA3D-F39B9644396D}" type="datetimeFigureOut">
               <a:rPr lang="en-US" smtClean="0"/>
-              <a:t>2/28/20</a:t>
+              <a:t>3/2/20</a:t>
             </a:fld>
             <a:endParaRPr lang="en-US"/>
           </a:p>
@@ -2787,7 +2792,7 @@
           <a:p>
             <a:fld id="{187C63FD-3E6A-F34B-BA3D-F39B9644396D}" type="datetimeFigureOut">
               <a:rPr lang="en-US" smtClean="0"/>
-              <a:t>2/28/20</a:t>
+              <a:t>3/2/20</a:t>
             </a:fld>
             <a:endParaRPr lang="en-US"/>
           </a:p>
@@ -3000,7 +3005,7 @@
           <a:p>
             <a:fld id="{187C63FD-3E6A-F34B-BA3D-F39B9644396D}" type="datetimeFigureOut">
               <a:rPr lang="en-US" smtClean="0"/>
-              <a:t>2/28/20</a:t>
+              <a:t>3/2/20</a:t>
             </a:fld>
             <a:endParaRPr lang="en-US"/>
           </a:p>
@@ -3487,7 +3492,7 @@
         <p:spPr>
           <a:xfrm>
             <a:off x="619432" y="1519084"/>
-            <a:ext cx="351378" cy="369332"/>
+            <a:ext cx="287258" cy="369332"/>
           </a:xfrm>
           <a:prstGeom prst="rect">
             <a:avLst/>
@@ -3504,7 +3509,7 @@
               <a:rPr lang="en-US" dirty="0">
                 <a:latin typeface="Times" pitchFamily="2" charset="0"/>
               </a:rPr>
-              <a:t>A</a:t>
+              <a:t>a</a:t>
             </a:r>
           </a:p>
         </p:txBody>
@@ -3524,7 +3529,7 @@
         <p:spPr>
           <a:xfrm>
             <a:off x="4650390" y="1465373"/>
-            <a:ext cx="338554" cy="369332"/>
+            <a:ext cx="300082" cy="369332"/>
           </a:xfrm>
           <a:prstGeom prst="rect">
             <a:avLst/>
@@ -3541,7 +3546,7 @@
               <a:rPr lang="en-US" dirty="0">
                 <a:latin typeface="Times" pitchFamily="2" charset="0"/>
               </a:rPr>
-              <a:t>B</a:t>
+              <a:t>b</a:t>
             </a:r>
           </a:p>
         </p:txBody>

</xml_diff>

<commit_message>
minor tweaks in figures
</commit_message>
<xml_diff>
--- a/7_figures/figure_3.pptx
+++ b/7_figures/figure_3.pptx
@@ -2,7 +2,7 @@
 <file path=ppt/presentation.xml><?xml version="1.0" encoding="utf-8"?>
 <p:presentation xmlns:a="http://schemas.openxmlformats.org/drawingml/2006/main" xmlns:r="http://schemas.openxmlformats.org/officeDocument/2006/relationships" xmlns:p="http://schemas.openxmlformats.org/presentationml/2006/main" saveSubsetFonts="1" autoCompressPictures="0">
   <p:sldMasterIdLst>
-    <p:sldMasterId id="2147483660" r:id="rId1"/>
+    <p:sldMasterId id="2147483672" r:id="rId1"/>
   </p:sldMasterIdLst>
   <p:notesMasterIdLst>
     <p:notesMasterId r:id="rId3"/>
@@ -10,7 +10,7 @@
   <p:sldIdLst>
     <p:sldId id="256" r:id="rId2"/>
   </p:sldIdLst>
-  <p:sldSz cx="9144000" cy="6858000" type="screen4x3"/>
+  <p:sldSz cx="9144000" cy="4338638"/>
   <p:notesSz cx="6858000" cy="9144000"/>
   <p:defaultTextStyle>
     <a:defPPr>
@@ -197,7 +197,7 @@
           <a:p>
             <a:fld id="{5423D7C1-6177-F347-981B-A0816949474E}" type="datetimeFigureOut">
               <a:rPr lang="en-US" smtClean="0"/>
-              <a:t>3/2/20</a:t>
+              <a:t>7/24/20</a:t>
             </a:fld>
             <a:endParaRPr lang="en-US"/>
           </a:p>
@@ -215,8 +215,8 @@
         </p:nvSpPr>
         <p:spPr>
           <a:xfrm>
-            <a:off x="1371600" y="1143000"/>
-            <a:ext cx="4114800" cy="3086100"/>
+            <a:off x="177800" y="1143000"/>
+            <a:ext cx="6502400" cy="3086100"/>
           </a:xfrm>
           <a:prstGeom prst="rect">
             <a:avLst/>
@@ -491,7 +491,12 @@
             <p:ph type="sldImg"/>
           </p:nvPr>
         </p:nvSpPr>
-        <p:spPr/>
+        <p:spPr>
+          <a:xfrm>
+            <a:off x="177800" y="1143000"/>
+            <a:ext cx="6502400" cy="3086100"/>
+          </a:xfrm>
+        </p:spPr>
       </p:sp>
       <p:sp>
         <p:nvSpPr>
@@ -580,15 +585,15 @@
         </p:nvSpPr>
         <p:spPr>
           <a:xfrm>
-            <a:off x="685800" y="1122363"/>
-            <a:ext cx="7772400" cy="2387600"/>
+            <a:off x="1143000" y="710050"/>
+            <a:ext cx="6858000" cy="1510489"/>
           </a:xfrm>
         </p:spPr>
         <p:txBody>
           <a:bodyPr anchor="b"/>
           <a:lstStyle>
             <a:lvl1pPr algn="ctr">
-              <a:defRPr sz="6000"/>
+              <a:defRPr sz="3796"/>
             </a:lvl1pPr>
           </a:lstStyle>
           <a:p>
@@ -612,8 +617,8 @@
         </p:nvSpPr>
         <p:spPr>
           <a:xfrm>
-            <a:off x="1143000" y="3602038"/>
-            <a:ext cx="6858000" cy="1655762"/>
+            <a:off x="1143000" y="2278789"/>
+            <a:ext cx="6858000" cy="1047500"/>
           </a:xfrm>
         </p:spPr>
         <p:txBody>
@@ -621,39 +626,39 @@
           <a:lstStyle>
             <a:lvl1pPr marL="0" indent="0" algn="ctr">
               <a:buNone/>
-              <a:defRPr sz="2400"/>
+              <a:defRPr sz="1518"/>
             </a:lvl1pPr>
-            <a:lvl2pPr marL="457200" indent="0" algn="ctr">
-              <a:buNone/>
-              <a:defRPr sz="2000"/>
+            <a:lvl2pPr marL="289225" indent="0" algn="ctr">
+              <a:buNone/>
+              <a:defRPr sz="1265"/>
             </a:lvl2pPr>
-            <a:lvl3pPr marL="914400" indent="0" algn="ctr">
-              <a:buNone/>
-              <a:defRPr sz="1800"/>
+            <a:lvl3pPr marL="578449" indent="0" algn="ctr">
+              <a:buNone/>
+              <a:defRPr sz="1139"/>
             </a:lvl3pPr>
-            <a:lvl4pPr marL="1371600" indent="0" algn="ctr">
-              <a:buNone/>
-              <a:defRPr sz="1600"/>
+            <a:lvl4pPr marL="867674" indent="0" algn="ctr">
+              <a:buNone/>
+              <a:defRPr sz="1012"/>
             </a:lvl4pPr>
-            <a:lvl5pPr marL="1828800" indent="0" algn="ctr">
-              <a:buNone/>
-              <a:defRPr sz="1600"/>
+            <a:lvl5pPr marL="1156899" indent="0" algn="ctr">
+              <a:buNone/>
+              <a:defRPr sz="1012"/>
             </a:lvl5pPr>
-            <a:lvl6pPr marL="2286000" indent="0" algn="ctr">
-              <a:buNone/>
-              <a:defRPr sz="1600"/>
+            <a:lvl6pPr marL="1446124" indent="0" algn="ctr">
+              <a:buNone/>
+              <a:defRPr sz="1012"/>
             </a:lvl6pPr>
-            <a:lvl7pPr marL="2743200" indent="0" algn="ctr">
-              <a:buNone/>
-              <a:defRPr sz="1600"/>
+            <a:lvl7pPr marL="1735348" indent="0" algn="ctr">
+              <a:buNone/>
+              <a:defRPr sz="1012"/>
             </a:lvl7pPr>
-            <a:lvl8pPr marL="3200400" indent="0" algn="ctr">
-              <a:buNone/>
-              <a:defRPr sz="1600"/>
+            <a:lvl8pPr marL="2024573" indent="0" algn="ctr">
+              <a:buNone/>
+              <a:defRPr sz="1012"/>
             </a:lvl8pPr>
-            <a:lvl9pPr marL="3657600" indent="0" algn="ctr">
-              <a:buNone/>
-              <a:defRPr sz="1600"/>
+            <a:lvl9pPr marL="2313798" indent="0" algn="ctr">
+              <a:buNone/>
+              <a:defRPr sz="1012"/>
             </a:lvl9pPr>
           </a:lstStyle>
           <a:p>
@@ -682,7 +687,7 @@
           <a:p>
             <a:fld id="{187C63FD-3E6A-F34B-BA3D-F39B9644396D}" type="datetimeFigureOut">
               <a:rPr lang="en-US" smtClean="0"/>
-              <a:t>3/2/20</a:t>
+              <a:t>7/24/20</a:t>
             </a:fld>
             <a:endParaRPr lang="en-US"/>
           </a:p>
@@ -733,7 +738,7 @@
     </p:spTree>
     <p:extLst>
       <p:ext uri="{BB962C8B-B14F-4D97-AF65-F5344CB8AC3E}">
-        <p14:creationId xmlns:p14="http://schemas.microsoft.com/office/powerpoint/2010/main" val="2431354632"/>
+        <p14:creationId xmlns:p14="http://schemas.microsoft.com/office/powerpoint/2010/main" val="1925960006"/>
       </p:ext>
     </p:extLst>
   </p:cSld>
@@ -852,7 +857,7 @@
           <a:p>
             <a:fld id="{187C63FD-3E6A-F34B-BA3D-F39B9644396D}" type="datetimeFigureOut">
               <a:rPr lang="en-US" smtClean="0"/>
-              <a:t>3/2/20</a:t>
+              <a:t>7/24/20</a:t>
             </a:fld>
             <a:endParaRPr lang="en-US"/>
           </a:p>
@@ -903,7 +908,7 @@
     </p:spTree>
     <p:extLst>
       <p:ext uri="{BB962C8B-B14F-4D97-AF65-F5344CB8AC3E}">
-        <p14:creationId xmlns:p14="http://schemas.microsoft.com/office/powerpoint/2010/main" val="2781133604"/>
+        <p14:creationId xmlns:p14="http://schemas.microsoft.com/office/powerpoint/2010/main" val="647445186"/>
       </p:ext>
     </p:extLst>
   </p:cSld>
@@ -942,8 +947,8 @@
         </p:nvSpPr>
         <p:spPr>
           <a:xfrm>
-            <a:off x="6543675" y="365125"/>
-            <a:ext cx="1971675" cy="5811838"/>
+            <a:off x="6543675" y="230992"/>
+            <a:ext cx="1971675" cy="3676795"/>
           </a:xfrm>
         </p:spPr>
         <p:txBody>
@@ -970,8 +975,8 @@
         </p:nvSpPr>
         <p:spPr>
           <a:xfrm>
-            <a:off x="628650" y="365125"/>
-            <a:ext cx="5800725" cy="5811838"/>
+            <a:off x="628650" y="230992"/>
+            <a:ext cx="5800725" cy="3676795"/>
           </a:xfrm>
         </p:spPr>
         <p:txBody>
@@ -1032,7 +1037,7 @@
           <a:p>
             <a:fld id="{187C63FD-3E6A-F34B-BA3D-F39B9644396D}" type="datetimeFigureOut">
               <a:rPr lang="en-US" smtClean="0"/>
-              <a:t>3/2/20</a:t>
+              <a:t>7/24/20</a:t>
             </a:fld>
             <a:endParaRPr lang="en-US"/>
           </a:p>
@@ -1083,7 +1088,7 @@
     </p:spTree>
     <p:extLst>
       <p:ext uri="{BB962C8B-B14F-4D97-AF65-F5344CB8AC3E}">
-        <p14:creationId xmlns:p14="http://schemas.microsoft.com/office/powerpoint/2010/main" val="1000548481"/>
+        <p14:creationId xmlns:p14="http://schemas.microsoft.com/office/powerpoint/2010/main" val="3662113602"/>
       </p:ext>
     </p:extLst>
   </p:cSld>
@@ -1202,7 +1207,7 @@
           <a:p>
             <a:fld id="{187C63FD-3E6A-F34B-BA3D-F39B9644396D}" type="datetimeFigureOut">
               <a:rPr lang="en-US" smtClean="0"/>
-              <a:t>3/2/20</a:t>
+              <a:t>7/24/20</a:t>
             </a:fld>
             <a:endParaRPr lang="en-US"/>
           </a:p>
@@ -1253,7 +1258,7 @@
     </p:spTree>
     <p:extLst>
       <p:ext uri="{BB962C8B-B14F-4D97-AF65-F5344CB8AC3E}">
-        <p14:creationId xmlns:p14="http://schemas.microsoft.com/office/powerpoint/2010/main" val="2676558665"/>
+        <p14:creationId xmlns:p14="http://schemas.microsoft.com/office/powerpoint/2010/main" val="1221704886"/>
       </p:ext>
     </p:extLst>
   </p:cSld>
@@ -1292,15 +1297,15 @@
         </p:nvSpPr>
         <p:spPr>
           <a:xfrm>
-            <a:off x="623888" y="1709739"/>
-            <a:ext cx="7886700" cy="2852737"/>
+            <a:off x="623888" y="1081647"/>
+            <a:ext cx="7886700" cy="1804753"/>
           </a:xfrm>
         </p:spPr>
         <p:txBody>
           <a:bodyPr anchor="b"/>
           <a:lstStyle>
             <a:lvl1pPr>
-              <a:defRPr sz="6000"/>
+              <a:defRPr sz="3796"/>
             </a:lvl1pPr>
           </a:lstStyle>
           <a:p>
@@ -1324,8 +1329,8 @@
         </p:nvSpPr>
         <p:spPr>
           <a:xfrm>
-            <a:off x="623888" y="4589464"/>
-            <a:ext cx="7886700" cy="1500187"/>
+            <a:off x="623888" y="2903473"/>
+            <a:ext cx="7886700" cy="949077"/>
           </a:xfrm>
         </p:spPr>
         <p:txBody>
@@ -1333,15 +1338,17 @@
           <a:lstStyle>
             <a:lvl1pPr marL="0" indent="0">
               <a:buNone/>
-              <a:defRPr sz="2400">
+              <a:defRPr sz="1518">
                 <a:solidFill>
-                  <a:schemeClr val="tx1"/>
+                  <a:schemeClr val="tx1">
+                    <a:tint val="75000"/>
+                  </a:schemeClr>
                 </a:solidFill>
               </a:defRPr>
             </a:lvl1pPr>
-            <a:lvl2pPr marL="457200" indent="0">
-              <a:buNone/>
-              <a:defRPr sz="2000">
+            <a:lvl2pPr marL="289225" indent="0">
+              <a:buNone/>
+              <a:defRPr sz="1265">
                 <a:solidFill>
                   <a:schemeClr val="tx1">
                     <a:tint val="75000"/>
@@ -1349,9 +1356,9 @@
                 </a:solidFill>
               </a:defRPr>
             </a:lvl2pPr>
-            <a:lvl3pPr marL="914400" indent="0">
-              <a:buNone/>
-              <a:defRPr sz="1800">
+            <a:lvl3pPr marL="578449" indent="0">
+              <a:buNone/>
+              <a:defRPr sz="1139">
                 <a:solidFill>
                   <a:schemeClr val="tx1">
                     <a:tint val="75000"/>
@@ -1359,9 +1366,9 @@
                 </a:solidFill>
               </a:defRPr>
             </a:lvl3pPr>
-            <a:lvl4pPr marL="1371600" indent="0">
-              <a:buNone/>
-              <a:defRPr sz="1600">
+            <a:lvl4pPr marL="867674" indent="0">
+              <a:buNone/>
+              <a:defRPr sz="1012">
                 <a:solidFill>
                   <a:schemeClr val="tx1">
                     <a:tint val="75000"/>
@@ -1369,9 +1376,9 @@
                 </a:solidFill>
               </a:defRPr>
             </a:lvl4pPr>
-            <a:lvl5pPr marL="1828800" indent="0">
-              <a:buNone/>
-              <a:defRPr sz="1600">
+            <a:lvl5pPr marL="1156899" indent="0">
+              <a:buNone/>
+              <a:defRPr sz="1012">
                 <a:solidFill>
                   <a:schemeClr val="tx1">
                     <a:tint val="75000"/>
@@ -1379,9 +1386,9 @@
                 </a:solidFill>
               </a:defRPr>
             </a:lvl5pPr>
-            <a:lvl6pPr marL="2286000" indent="0">
-              <a:buNone/>
-              <a:defRPr sz="1600">
+            <a:lvl6pPr marL="1446124" indent="0">
+              <a:buNone/>
+              <a:defRPr sz="1012">
                 <a:solidFill>
                   <a:schemeClr val="tx1">
                     <a:tint val="75000"/>
@@ -1389,9 +1396,9 @@
                 </a:solidFill>
               </a:defRPr>
             </a:lvl6pPr>
-            <a:lvl7pPr marL="2743200" indent="0">
-              <a:buNone/>
-              <a:defRPr sz="1600">
+            <a:lvl7pPr marL="1735348" indent="0">
+              <a:buNone/>
+              <a:defRPr sz="1012">
                 <a:solidFill>
                   <a:schemeClr val="tx1">
                     <a:tint val="75000"/>
@@ -1399,9 +1406,9 @@
                 </a:solidFill>
               </a:defRPr>
             </a:lvl7pPr>
-            <a:lvl8pPr marL="3200400" indent="0">
-              <a:buNone/>
-              <a:defRPr sz="1600">
+            <a:lvl8pPr marL="2024573" indent="0">
+              <a:buNone/>
+              <a:defRPr sz="1012">
                 <a:solidFill>
                   <a:schemeClr val="tx1">
                     <a:tint val="75000"/>
@@ -1409,9 +1416,9 @@
                 </a:solidFill>
               </a:defRPr>
             </a:lvl8pPr>
-            <a:lvl9pPr marL="3657600" indent="0">
-              <a:buNone/>
-              <a:defRPr sz="1600">
+            <a:lvl9pPr marL="2313798" indent="0">
+              <a:buNone/>
+              <a:defRPr sz="1012">
                 <a:solidFill>
                   <a:schemeClr val="tx1">
                     <a:tint val="75000"/>
@@ -1446,7 +1453,7 @@
           <a:p>
             <a:fld id="{187C63FD-3E6A-F34B-BA3D-F39B9644396D}" type="datetimeFigureOut">
               <a:rPr lang="en-US" smtClean="0"/>
-              <a:t>3/2/20</a:t>
+              <a:t>7/24/20</a:t>
             </a:fld>
             <a:endParaRPr lang="en-US"/>
           </a:p>
@@ -1497,7 +1504,7 @@
     </p:spTree>
     <p:extLst>
       <p:ext uri="{BB962C8B-B14F-4D97-AF65-F5344CB8AC3E}">
-        <p14:creationId xmlns:p14="http://schemas.microsoft.com/office/powerpoint/2010/main" val="3652832336"/>
+        <p14:creationId xmlns:p14="http://schemas.microsoft.com/office/powerpoint/2010/main" val="1690421451"/>
       </p:ext>
     </p:extLst>
   </p:cSld>
@@ -1559,8 +1566,8 @@
         </p:nvSpPr>
         <p:spPr>
           <a:xfrm>
-            <a:off x="628650" y="1825625"/>
-            <a:ext cx="3886200" cy="4351338"/>
+            <a:off x="628650" y="1154961"/>
+            <a:ext cx="3886200" cy="2752826"/>
           </a:xfrm>
         </p:spPr>
         <p:txBody>
@@ -1616,8 +1623,8 @@
         </p:nvSpPr>
         <p:spPr>
           <a:xfrm>
-            <a:off x="4629150" y="1825625"/>
-            <a:ext cx="3886200" cy="4351338"/>
+            <a:off x="4629150" y="1154961"/>
+            <a:ext cx="3886200" cy="2752826"/>
           </a:xfrm>
         </p:spPr>
         <p:txBody>
@@ -1678,7 +1685,7 @@
           <a:p>
             <a:fld id="{187C63FD-3E6A-F34B-BA3D-F39B9644396D}" type="datetimeFigureOut">
               <a:rPr lang="en-US" smtClean="0"/>
-              <a:t>3/2/20</a:t>
+              <a:t>7/24/20</a:t>
             </a:fld>
             <a:endParaRPr lang="en-US"/>
           </a:p>
@@ -1729,7 +1736,7 @@
     </p:spTree>
     <p:extLst>
       <p:ext uri="{BB962C8B-B14F-4D97-AF65-F5344CB8AC3E}">
-        <p14:creationId xmlns:p14="http://schemas.microsoft.com/office/powerpoint/2010/main" val="3397052647"/>
+        <p14:creationId xmlns:p14="http://schemas.microsoft.com/office/powerpoint/2010/main" val="3812271769"/>
       </p:ext>
     </p:extLst>
   </p:cSld>
@@ -1768,8 +1775,8 @@
         </p:nvSpPr>
         <p:spPr>
           <a:xfrm>
-            <a:off x="629841" y="365126"/>
-            <a:ext cx="7886700" cy="1325563"/>
+            <a:off x="629841" y="230993"/>
+            <a:ext cx="7886700" cy="838603"/>
           </a:xfrm>
         </p:spPr>
         <p:txBody>
@@ -1796,8 +1803,8 @@
         </p:nvSpPr>
         <p:spPr>
           <a:xfrm>
-            <a:off x="629842" y="1681163"/>
-            <a:ext cx="3868340" cy="823912"/>
+            <a:off x="629842" y="1063569"/>
+            <a:ext cx="3868340" cy="521239"/>
           </a:xfrm>
         </p:spPr>
         <p:txBody>
@@ -1805,39 +1812,39 @@
           <a:lstStyle>
             <a:lvl1pPr marL="0" indent="0">
               <a:buNone/>
-              <a:defRPr sz="2400" b="1"/>
+              <a:defRPr sz="1518" b="1"/>
             </a:lvl1pPr>
-            <a:lvl2pPr marL="457200" indent="0">
-              <a:buNone/>
-              <a:defRPr sz="2000" b="1"/>
+            <a:lvl2pPr marL="289225" indent="0">
+              <a:buNone/>
+              <a:defRPr sz="1265" b="1"/>
             </a:lvl2pPr>
-            <a:lvl3pPr marL="914400" indent="0">
-              <a:buNone/>
-              <a:defRPr sz="1800" b="1"/>
+            <a:lvl3pPr marL="578449" indent="0">
+              <a:buNone/>
+              <a:defRPr sz="1139" b="1"/>
             </a:lvl3pPr>
-            <a:lvl4pPr marL="1371600" indent="0">
-              <a:buNone/>
-              <a:defRPr sz="1600" b="1"/>
+            <a:lvl4pPr marL="867674" indent="0">
+              <a:buNone/>
+              <a:defRPr sz="1012" b="1"/>
             </a:lvl4pPr>
-            <a:lvl5pPr marL="1828800" indent="0">
-              <a:buNone/>
-              <a:defRPr sz="1600" b="1"/>
+            <a:lvl5pPr marL="1156899" indent="0">
+              <a:buNone/>
+              <a:defRPr sz="1012" b="1"/>
             </a:lvl5pPr>
-            <a:lvl6pPr marL="2286000" indent="0">
-              <a:buNone/>
-              <a:defRPr sz="1600" b="1"/>
+            <a:lvl6pPr marL="1446124" indent="0">
+              <a:buNone/>
+              <a:defRPr sz="1012" b="1"/>
             </a:lvl6pPr>
-            <a:lvl7pPr marL="2743200" indent="0">
-              <a:buNone/>
-              <a:defRPr sz="1600" b="1"/>
+            <a:lvl7pPr marL="1735348" indent="0">
+              <a:buNone/>
+              <a:defRPr sz="1012" b="1"/>
             </a:lvl7pPr>
-            <a:lvl8pPr marL="3200400" indent="0">
-              <a:buNone/>
-              <a:defRPr sz="1600" b="1"/>
+            <a:lvl8pPr marL="2024573" indent="0">
+              <a:buNone/>
+              <a:defRPr sz="1012" b="1"/>
             </a:lvl8pPr>
-            <a:lvl9pPr marL="3657600" indent="0">
-              <a:buNone/>
-              <a:defRPr sz="1600" b="1"/>
+            <a:lvl9pPr marL="2313798" indent="0">
+              <a:buNone/>
+              <a:defRPr sz="1012" b="1"/>
             </a:lvl9pPr>
           </a:lstStyle>
           <a:p>
@@ -1861,8 +1868,8 @@
         </p:nvSpPr>
         <p:spPr>
           <a:xfrm>
-            <a:off x="629842" y="2505075"/>
-            <a:ext cx="3868340" cy="3684588"/>
+            <a:off x="629842" y="1584808"/>
+            <a:ext cx="3868340" cy="2331014"/>
           </a:xfrm>
         </p:spPr>
         <p:txBody>
@@ -1918,8 +1925,8 @@
         </p:nvSpPr>
         <p:spPr>
           <a:xfrm>
-            <a:off x="4629150" y="1681163"/>
-            <a:ext cx="3887391" cy="823912"/>
+            <a:off x="4629150" y="1063569"/>
+            <a:ext cx="3887391" cy="521239"/>
           </a:xfrm>
         </p:spPr>
         <p:txBody>
@@ -1927,39 +1934,39 @@
           <a:lstStyle>
             <a:lvl1pPr marL="0" indent="0">
               <a:buNone/>
-              <a:defRPr sz="2400" b="1"/>
+              <a:defRPr sz="1518" b="1"/>
             </a:lvl1pPr>
-            <a:lvl2pPr marL="457200" indent="0">
-              <a:buNone/>
-              <a:defRPr sz="2000" b="1"/>
+            <a:lvl2pPr marL="289225" indent="0">
+              <a:buNone/>
+              <a:defRPr sz="1265" b="1"/>
             </a:lvl2pPr>
-            <a:lvl3pPr marL="914400" indent="0">
-              <a:buNone/>
-              <a:defRPr sz="1800" b="1"/>
+            <a:lvl3pPr marL="578449" indent="0">
+              <a:buNone/>
+              <a:defRPr sz="1139" b="1"/>
             </a:lvl3pPr>
-            <a:lvl4pPr marL="1371600" indent="0">
-              <a:buNone/>
-              <a:defRPr sz="1600" b="1"/>
+            <a:lvl4pPr marL="867674" indent="0">
+              <a:buNone/>
+              <a:defRPr sz="1012" b="1"/>
             </a:lvl4pPr>
-            <a:lvl5pPr marL="1828800" indent="0">
-              <a:buNone/>
-              <a:defRPr sz="1600" b="1"/>
+            <a:lvl5pPr marL="1156899" indent="0">
+              <a:buNone/>
+              <a:defRPr sz="1012" b="1"/>
             </a:lvl5pPr>
-            <a:lvl6pPr marL="2286000" indent="0">
-              <a:buNone/>
-              <a:defRPr sz="1600" b="1"/>
+            <a:lvl6pPr marL="1446124" indent="0">
+              <a:buNone/>
+              <a:defRPr sz="1012" b="1"/>
             </a:lvl6pPr>
-            <a:lvl7pPr marL="2743200" indent="0">
-              <a:buNone/>
-              <a:defRPr sz="1600" b="1"/>
+            <a:lvl7pPr marL="1735348" indent="0">
+              <a:buNone/>
+              <a:defRPr sz="1012" b="1"/>
             </a:lvl7pPr>
-            <a:lvl8pPr marL="3200400" indent="0">
-              <a:buNone/>
-              <a:defRPr sz="1600" b="1"/>
+            <a:lvl8pPr marL="2024573" indent="0">
+              <a:buNone/>
+              <a:defRPr sz="1012" b="1"/>
             </a:lvl8pPr>
-            <a:lvl9pPr marL="3657600" indent="0">
-              <a:buNone/>
-              <a:defRPr sz="1600" b="1"/>
+            <a:lvl9pPr marL="2313798" indent="0">
+              <a:buNone/>
+              <a:defRPr sz="1012" b="1"/>
             </a:lvl9pPr>
           </a:lstStyle>
           <a:p>
@@ -1983,8 +1990,8 @@
         </p:nvSpPr>
         <p:spPr>
           <a:xfrm>
-            <a:off x="4629150" y="2505075"/>
-            <a:ext cx="3887391" cy="3684588"/>
+            <a:off x="4629150" y="1584808"/>
+            <a:ext cx="3887391" cy="2331014"/>
           </a:xfrm>
         </p:spPr>
         <p:txBody>
@@ -2045,7 +2052,7 @@
           <a:p>
             <a:fld id="{187C63FD-3E6A-F34B-BA3D-F39B9644396D}" type="datetimeFigureOut">
               <a:rPr lang="en-US" smtClean="0"/>
-              <a:t>3/2/20</a:t>
+              <a:t>7/24/20</a:t>
             </a:fld>
             <a:endParaRPr lang="en-US"/>
           </a:p>
@@ -2096,7 +2103,7 @@
     </p:spTree>
     <p:extLst>
       <p:ext uri="{BB962C8B-B14F-4D97-AF65-F5344CB8AC3E}">
-        <p14:creationId xmlns:p14="http://schemas.microsoft.com/office/powerpoint/2010/main" val="1912606065"/>
+        <p14:creationId xmlns:p14="http://schemas.microsoft.com/office/powerpoint/2010/main" val="734014220"/>
       </p:ext>
     </p:extLst>
   </p:cSld>
@@ -2163,7 +2170,7 @@
           <a:p>
             <a:fld id="{187C63FD-3E6A-F34B-BA3D-F39B9644396D}" type="datetimeFigureOut">
               <a:rPr lang="en-US" smtClean="0"/>
-              <a:t>3/2/20</a:t>
+              <a:t>7/24/20</a:t>
             </a:fld>
             <a:endParaRPr lang="en-US"/>
           </a:p>
@@ -2214,7 +2221,7 @@
     </p:spTree>
     <p:extLst>
       <p:ext uri="{BB962C8B-B14F-4D97-AF65-F5344CB8AC3E}">
-        <p14:creationId xmlns:p14="http://schemas.microsoft.com/office/powerpoint/2010/main" val="1236839817"/>
+        <p14:creationId xmlns:p14="http://schemas.microsoft.com/office/powerpoint/2010/main" val="3534867804"/>
       </p:ext>
     </p:extLst>
   </p:cSld>
@@ -2258,7 +2265,7 @@
           <a:p>
             <a:fld id="{187C63FD-3E6A-F34B-BA3D-F39B9644396D}" type="datetimeFigureOut">
               <a:rPr lang="en-US" smtClean="0"/>
-              <a:t>3/2/20</a:t>
+              <a:t>7/24/20</a:t>
             </a:fld>
             <a:endParaRPr lang="en-US"/>
           </a:p>
@@ -2309,7 +2316,7 @@
     </p:spTree>
     <p:extLst>
       <p:ext uri="{BB962C8B-B14F-4D97-AF65-F5344CB8AC3E}">
-        <p14:creationId xmlns:p14="http://schemas.microsoft.com/office/powerpoint/2010/main" val="354762386"/>
+        <p14:creationId xmlns:p14="http://schemas.microsoft.com/office/powerpoint/2010/main" val="490424215"/>
       </p:ext>
     </p:extLst>
   </p:cSld>
@@ -2348,15 +2355,15 @@
         </p:nvSpPr>
         <p:spPr>
           <a:xfrm>
-            <a:off x="629841" y="457200"/>
-            <a:ext cx="2949178" cy="1600200"/>
+            <a:off x="629841" y="289242"/>
+            <a:ext cx="2949178" cy="1012349"/>
           </a:xfrm>
         </p:spPr>
         <p:txBody>
           <a:bodyPr anchor="b"/>
           <a:lstStyle>
             <a:lvl1pPr>
-              <a:defRPr sz="3200"/>
+              <a:defRPr sz="2024"/>
             </a:lvl1pPr>
           </a:lstStyle>
           <a:p>
@@ -2380,39 +2387,39 @@
         </p:nvSpPr>
         <p:spPr>
           <a:xfrm>
-            <a:off x="3887391" y="987426"/>
-            <a:ext cx="4629150" cy="4873625"/>
+            <a:off x="3887391" y="624684"/>
+            <a:ext cx="4629150" cy="3083245"/>
           </a:xfrm>
         </p:spPr>
         <p:txBody>
           <a:bodyPr/>
           <a:lstStyle>
             <a:lvl1pPr>
-              <a:defRPr sz="3200"/>
+              <a:defRPr sz="2024"/>
             </a:lvl1pPr>
             <a:lvl2pPr>
-              <a:defRPr sz="2800"/>
+              <a:defRPr sz="1771"/>
             </a:lvl2pPr>
             <a:lvl3pPr>
-              <a:defRPr sz="2400"/>
+              <a:defRPr sz="1518"/>
             </a:lvl3pPr>
             <a:lvl4pPr>
-              <a:defRPr sz="2000"/>
+              <a:defRPr sz="1265"/>
             </a:lvl4pPr>
             <a:lvl5pPr>
-              <a:defRPr sz="2000"/>
+              <a:defRPr sz="1265"/>
             </a:lvl5pPr>
             <a:lvl6pPr>
-              <a:defRPr sz="2000"/>
+              <a:defRPr sz="1265"/>
             </a:lvl6pPr>
             <a:lvl7pPr>
-              <a:defRPr sz="2000"/>
+              <a:defRPr sz="1265"/>
             </a:lvl7pPr>
             <a:lvl8pPr>
-              <a:defRPr sz="2000"/>
+              <a:defRPr sz="1265"/>
             </a:lvl8pPr>
             <a:lvl9pPr>
-              <a:defRPr sz="2000"/>
+              <a:defRPr sz="1265"/>
             </a:lvl9pPr>
           </a:lstStyle>
           <a:p>
@@ -2465,8 +2472,8 @@
         </p:nvSpPr>
         <p:spPr>
           <a:xfrm>
-            <a:off x="629841" y="2057400"/>
-            <a:ext cx="2949178" cy="3811588"/>
+            <a:off x="629841" y="1301591"/>
+            <a:ext cx="2949178" cy="2411359"/>
           </a:xfrm>
         </p:spPr>
         <p:txBody>
@@ -2474,39 +2481,39 @@
           <a:lstStyle>
             <a:lvl1pPr marL="0" indent="0">
               <a:buNone/>
-              <a:defRPr sz="1600"/>
+              <a:defRPr sz="1012"/>
             </a:lvl1pPr>
-            <a:lvl2pPr marL="457200" indent="0">
-              <a:buNone/>
-              <a:defRPr sz="1400"/>
+            <a:lvl2pPr marL="289225" indent="0">
+              <a:buNone/>
+              <a:defRPr sz="886"/>
             </a:lvl2pPr>
-            <a:lvl3pPr marL="914400" indent="0">
-              <a:buNone/>
-              <a:defRPr sz="1200"/>
+            <a:lvl3pPr marL="578449" indent="0">
+              <a:buNone/>
+              <a:defRPr sz="759"/>
             </a:lvl3pPr>
-            <a:lvl4pPr marL="1371600" indent="0">
-              <a:buNone/>
-              <a:defRPr sz="1000"/>
+            <a:lvl4pPr marL="867674" indent="0">
+              <a:buNone/>
+              <a:defRPr sz="633"/>
             </a:lvl4pPr>
-            <a:lvl5pPr marL="1828800" indent="0">
-              <a:buNone/>
-              <a:defRPr sz="1000"/>
+            <a:lvl5pPr marL="1156899" indent="0">
+              <a:buNone/>
+              <a:defRPr sz="633"/>
             </a:lvl5pPr>
-            <a:lvl6pPr marL="2286000" indent="0">
-              <a:buNone/>
-              <a:defRPr sz="1000"/>
+            <a:lvl6pPr marL="1446124" indent="0">
+              <a:buNone/>
+              <a:defRPr sz="633"/>
             </a:lvl6pPr>
-            <a:lvl7pPr marL="2743200" indent="0">
-              <a:buNone/>
-              <a:defRPr sz="1000"/>
+            <a:lvl7pPr marL="1735348" indent="0">
+              <a:buNone/>
+              <a:defRPr sz="633"/>
             </a:lvl7pPr>
-            <a:lvl8pPr marL="3200400" indent="0">
-              <a:buNone/>
-              <a:defRPr sz="1000"/>
+            <a:lvl8pPr marL="2024573" indent="0">
+              <a:buNone/>
+              <a:defRPr sz="633"/>
             </a:lvl8pPr>
-            <a:lvl9pPr marL="3657600" indent="0">
-              <a:buNone/>
-              <a:defRPr sz="1000"/>
+            <a:lvl9pPr marL="2313798" indent="0">
+              <a:buNone/>
+              <a:defRPr sz="633"/>
             </a:lvl9pPr>
           </a:lstStyle>
           <a:p>
@@ -2535,7 +2542,7 @@
           <a:p>
             <a:fld id="{187C63FD-3E6A-F34B-BA3D-F39B9644396D}" type="datetimeFigureOut">
               <a:rPr lang="en-US" smtClean="0"/>
-              <a:t>3/2/20</a:t>
+              <a:t>7/24/20</a:t>
             </a:fld>
             <a:endParaRPr lang="en-US"/>
           </a:p>
@@ -2586,7 +2593,7 @@
     </p:spTree>
     <p:extLst>
       <p:ext uri="{BB962C8B-B14F-4D97-AF65-F5344CB8AC3E}">
-        <p14:creationId xmlns:p14="http://schemas.microsoft.com/office/powerpoint/2010/main" val="2406957699"/>
+        <p14:creationId xmlns:p14="http://schemas.microsoft.com/office/powerpoint/2010/main" val="2251958005"/>
       </p:ext>
     </p:extLst>
   </p:cSld>
@@ -2625,15 +2632,15 @@
         </p:nvSpPr>
         <p:spPr>
           <a:xfrm>
-            <a:off x="629841" y="457200"/>
-            <a:ext cx="2949178" cy="1600200"/>
+            <a:off x="629841" y="289242"/>
+            <a:ext cx="2949178" cy="1012349"/>
           </a:xfrm>
         </p:spPr>
         <p:txBody>
           <a:bodyPr anchor="b"/>
           <a:lstStyle>
             <a:lvl1pPr>
-              <a:defRPr sz="3200"/>
+              <a:defRPr sz="2024"/>
             </a:lvl1pPr>
           </a:lstStyle>
           <a:p>
@@ -2657,8 +2664,8 @@
         </p:nvSpPr>
         <p:spPr>
           <a:xfrm>
-            <a:off x="3887391" y="987426"/>
-            <a:ext cx="4629150" cy="4873625"/>
+            <a:off x="3887391" y="624684"/>
+            <a:ext cx="4629150" cy="3083245"/>
           </a:xfrm>
         </p:spPr>
         <p:txBody>
@@ -2666,39 +2673,39 @@
           <a:lstStyle>
             <a:lvl1pPr marL="0" indent="0">
               <a:buNone/>
-              <a:defRPr sz="3200"/>
+              <a:defRPr sz="2024"/>
             </a:lvl1pPr>
-            <a:lvl2pPr marL="457200" indent="0">
-              <a:buNone/>
-              <a:defRPr sz="2800"/>
+            <a:lvl2pPr marL="289225" indent="0">
+              <a:buNone/>
+              <a:defRPr sz="1771"/>
             </a:lvl2pPr>
-            <a:lvl3pPr marL="914400" indent="0">
-              <a:buNone/>
-              <a:defRPr sz="2400"/>
+            <a:lvl3pPr marL="578449" indent="0">
+              <a:buNone/>
+              <a:defRPr sz="1518"/>
             </a:lvl3pPr>
-            <a:lvl4pPr marL="1371600" indent="0">
-              <a:buNone/>
-              <a:defRPr sz="2000"/>
+            <a:lvl4pPr marL="867674" indent="0">
+              <a:buNone/>
+              <a:defRPr sz="1265"/>
             </a:lvl4pPr>
-            <a:lvl5pPr marL="1828800" indent="0">
-              <a:buNone/>
-              <a:defRPr sz="2000"/>
+            <a:lvl5pPr marL="1156899" indent="0">
+              <a:buNone/>
+              <a:defRPr sz="1265"/>
             </a:lvl5pPr>
-            <a:lvl6pPr marL="2286000" indent="0">
-              <a:buNone/>
-              <a:defRPr sz="2000"/>
+            <a:lvl6pPr marL="1446124" indent="0">
+              <a:buNone/>
+              <a:defRPr sz="1265"/>
             </a:lvl6pPr>
-            <a:lvl7pPr marL="2743200" indent="0">
-              <a:buNone/>
-              <a:defRPr sz="2000"/>
+            <a:lvl7pPr marL="1735348" indent="0">
+              <a:buNone/>
+              <a:defRPr sz="1265"/>
             </a:lvl7pPr>
-            <a:lvl8pPr marL="3200400" indent="0">
-              <a:buNone/>
-              <a:defRPr sz="2000"/>
+            <a:lvl8pPr marL="2024573" indent="0">
+              <a:buNone/>
+              <a:defRPr sz="1265"/>
             </a:lvl8pPr>
-            <a:lvl9pPr marL="3657600" indent="0">
-              <a:buNone/>
-              <a:defRPr sz="2000"/>
+            <a:lvl9pPr marL="2313798" indent="0">
+              <a:buNone/>
+              <a:defRPr sz="1265"/>
             </a:lvl9pPr>
           </a:lstStyle>
           <a:p>
@@ -2722,8 +2729,8 @@
         </p:nvSpPr>
         <p:spPr>
           <a:xfrm>
-            <a:off x="629841" y="2057400"/>
-            <a:ext cx="2949178" cy="3811588"/>
+            <a:off x="629841" y="1301591"/>
+            <a:ext cx="2949178" cy="2411359"/>
           </a:xfrm>
         </p:spPr>
         <p:txBody>
@@ -2731,39 +2738,39 @@
           <a:lstStyle>
             <a:lvl1pPr marL="0" indent="0">
               <a:buNone/>
-              <a:defRPr sz="1600"/>
+              <a:defRPr sz="1012"/>
             </a:lvl1pPr>
-            <a:lvl2pPr marL="457200" indent="0">
-              <a:buNone/>
-              <a:defRPr sz="1400"/>
+            <a:lvl2pPr marL="289225" indent="0">
+              <a:buNone/>
+              <a:defRPr sz="886"/>
             </a:lvl2pPr>
-            <a:lvl3pPr marL="914400" indent="0">
-              <a:buNone/>
-              <a:defRPr sz="1200"/>
+            <a:lvl3pPr marL="578449" indent="0">
+              <a:buNone/>
+              <a:defRPr sz="759"/>
             </a:lvl3pPr>
-            <a:lvl4pPr marL="1371600" indent="0">
-              <a:buNone/>
-              <a:defRPr sz="1000"/>
+            <a:lvl4pPr marL="867674" indent="0">
+              <a:buNone/>
+              <a:defRPr sz="633"/>
             </a:lvl4pPr>
-            <a:lvl5pPr marL="1828800" indent="0">
-              <a:buNone/>
-              <a:defRPr sz="1000"/>
+            <a:lvl5pPr marL="1156899" indent="0">
+              <a:buNone/>
+              <a:defRPr sz="633"/>
             </a:lvl5pPr>
-            <a:lvl6pPr marL="2286000" indent="0">
-              <a:buNone/>
-              <a:defRPr sz="1000"/>
+            <a:lvl6pPr marL="1446124" indent="0">
+              <a:buNone/>
+              <a:defRPr sz="633"/>
             </a:lvl6pPr>
-            <a:lvl7pPr marL="2743200" indent="0">
-              <a:buNone/>
-              <a:defRPr sz="1000"/>
+            <a:lvl7pPr marL="1735348" indent="0">
+              <a:buNone/>
+              <a:defRPr sz="633"/>
             </a:lvl7pPr>
-            <a:lvl8pPr marL="3200400" indent="0">
-              <a:buNone/>
-              <a:defRPr sz="1000"/>
+            <a:lvl8pPr marL="2024573" indent="0">
+              <a:buNone/>
+              <a:defRPr sz="633"/>
             </a:lvl8pPr>
-            <a:lvl9pPr marL="3657600" indent="0">
-              <a:buNone/>
-              <a:defRPr sz="1000"/>
+            <a:lvl9pPr marL="2313798" indent="0">
+              <a:buNone/>
+              <a:defRPr sz="633"/>
             </a:lvl9pPr>
           </a:lstStyle>
           <a:p>
@@ -2792,7 +2799,7 @@
           <a:p>
             <a:fld id="{187C63FD-3E6A-F34B-BA3D-F39B9644396D}" type="datetimeFigureOut">
               <a:rPr lang="en-US" smtClean="0"/>
-              <a:t>3/2/20</a:t>
+              <a:t>7/24/20</a:t>
             </a:fld>
             <a:endParaRPr lang="en-US"/>
           </a:p>
@@ -2843,7 +2850,7 @@
     </p:spTree>
     <p:extLst>
       <p:ext uri="{BB962C8B-B14F-4D97-AF65-F5344CB8AC3E}">
-        <p14:creationId xmlns:p14="http://schemas.microsoft.com/office/powerpoint/2010/main" val="3188206237"/>
+        <p14:creationId xmlns:p14="http://schemas.microsoft.com/office/powerpoint/2010/main" val="1907259498"/>
       </p:ext>
     </p:extLst>
   </p:cSld>
@@ -2887,8 +2894,8 @@
         </p:nvSpPr>
         <p:spPr>
           <a:xfrm>
-            <a:off x="628650" y="365126"/>
-            <a:ext cx="7886700" cy="1325563"/>
+            <a:off x="628650" y="230993"/>
+            <a:ext cx="7886700" cy="838603"/>
           </a:xfrm>
           <a:prstGeom prst="rect">
             <a:avLst/>
@@ -2920,8 +2927,8 @@
         </p:nvSpPr>
         <p:spPr>
           <a:xfrm>
-            <a:off x="628650" y="1825625"/>
-            <a:ext cx="7886700" cy="4351338"/>
+            <a:off x="628650" y="1154961"/>
+            <a:ext cx="7886700" cy="2752826"/>
           </a:xfrm>
           <a:prstGeom prst="rect">
             <a:avLst/>
@@ -2982,8 +2989,8 @@
         </p:nvSpPr>
         <p:spPr>
           <a:xfrm>
-            <a:off x="628650" y="6356351"/>
-            <a:ext cx="2057400" cy="365125"/>
+            <a:off x="628650" y="4021275"/>
+            <a:ext cx="2057400" cy="230992"/>
           </a:xfrm>
           <a:prstGeom prst="rect">
             <a:avLst/>
@@ -2993,7 +3000,7 @@
           <a:bodyPr vert="horz" lIns="91440" tIns="45720" rIns="91440" bIns="45720" rtlCol="0" anchor="ctr"/>
           <a:lstStyle>
             <a:lvl1pPr algn="l">
-              <a:defRPr sz="1200">
+              <a:defRPr sz="759">
                 <a:solidFill>
                   <a:schemeClr val="tx1">
                     <a:tint val="75000"/>
@@ -3005,7 +3012,7 @@
           <a:p>
             <a:fld id="{187C63FD-3E6A-F34B-BA3D-F39B9644396D}" type="datetimeFigureOut">
               <a:rPr lang="en-US" smtClean="0"/>
-              <a:t>3/2/20</a:t>
+              <a:t>7/24/20</a:t>
             </a:fld>
             <a:endParaRPr lang="en-US"/>
           </a:p>
@@ -3023,8 +3030,8 @@
         </p:nvSpPr>
         <p:spPr>
           <a:xfrm>
-            <a:off x="3028950" y="6356351"/>
-            <a:ext cx="3086100" cy="365125"/>
+            <a:off x="3028950" y="4021275"/>
+            <a:ext cx="3086100" cy="230992"/>
           </a:xfrm>
           <a:prstGeom prst="rect">
             <a:avLst/>
@@ -3034,7 +3041,7 @@
           <a:bodyPr vert="horz" lIns="91440" tIns="45720" rIns="91440" bIns="45720" rtlCol="0" anchor="ctr"/>
           <a:lstStyle>
             <a:lvl1pPr algn="ctr">
-              <a:defRPr sz="1200">
+              <a:defRPr sz="759">
                 <a:solidFill>
                   <a:schemeClr val="tx1">
                     <a:tint val="75000"/>
@@ -3060,8 +3067,8 @@
         </p:nvSpPr>
         <p:spPr>
           <a:xfrm>
-            <a:off x="6457950" y="6356351"/>
-            <a:ext cx="2057400" cy="365125"/>
+            <a:off x="6457950" y="4021275"/>
+            <a:ext cx="2057400" cy="230992"/>
           </a:xfrm>
           <a:prstGeom prst="rect">
             <a:avLst/>
@@ -3071,7 +3078,7 @@
           <a:bodyPr vert="horz" lIns="91440" tIns="45720" rIns="91440" bIns="45720" rtlCol="0" anchor="ctr"/>
           <a:lstStyle>
             <a:lvl1pPr algn="r">
-              <a:defRPr sz="1200">
+              <a:defRPr sz="759">
                 <a:solidFill>
                   <a:schemeClr val="tx1">
                     <a:tint val="75000"/>
@@ -3092,27 +3099,27 @@
     </p:spTree>
     <p:extLst>
       <p:ext uri="{BB962C8B-B14F-4D97-AF65-F5344CB8AC3E}">
-        <p14:creationId xmlns:p14="http://schemas.microsoft.com/office/powerpoint/2010/main" val="3635101939"/>
+        <p14:creationId xmlns:p14="http://schemas.microsoft.com/office/powerpoint/2010/main" val="2900918778"/>
       </p:ext>
     </p:extLst>
   </p:cSld>
   <p:clrMap bg1="lt1" tx1="dk1" bg2="lt2" tx2="dk2" accent1="accent1" accent2="accent2" accent3="accent3" accent4="accent4" accent5="accent5" accent6="accent6" hlink="hlink" folHlink="folHlink"/>
   <p:sldLayoutIdLst>
-    <p:sldLayoutId id="2147483661" r:id="rId1"/>
-    <p:sldLayoutId id="2147483662" r:id="rId2"/>
-    <p:sldLayoutId id="2147483663" r:id="rId3"/>
-    <p:sldLayoutId id="2147483664" r:id="rId4"/>
-    <p:sldLayoutId id="2147483665" r:id="rId5"/>
-    <p:sldLayoutId id="2147483666" r:id="rId6"/>
-    <p:sldLayoutId id="2147483667" r:id="rId7"/>
-    <p:sldLayoutId id="2147483668" r:id="rId8"/>
-    <p:sldLayoutId id="2147483669" r:id="rId9"/>
-    <p:sldLayoutId id="2147483670" r:id="rId10"/>
-    <p:sldLayoutId id="2147483671" r:id="rId11"/>
+    <p:sldLayoutId id="2147483673" r:id="rId1"/>
+    <p:sldLayoutId id="2147483674" r:id="rId2"/>
+    <p:sldLayoutId id="2147483675" r:id="rId3"/>
+    <p:sldLayoutId id="2147483676" r:id="rId4"/>
+    <p:sldLayoutId id="2147483677" r:id="rId5"/>
+    <p:sldLayoutId id="2147483678" r:id="rId6"/>
+    <p:sldLayoutId id="2147483679" r:id="rId7"/>
+    <p:sldLayoutId id="2147483680" r:id="rId8"/>
+    <p:sldLayoutId id="2147483681" r:id="rId9"/>
+    <p:sldLayoutId id="2147483682" r:id="rId10"/>
+    <p:sldLayoutId id="2147483683" r:id="rId11"/>
   </p:sldLayoutIdLst>
   <p:txStyles>
     <p:titleStyle>
-      <a:lvl1pPr algn="l" defTabSz="914400" rtl="0" eaLnBrk="1" latinLnBrk="0" hangingPunct="1">
+      <a:lvl1pPr algn="l" defTabSz="578449" rtl="0" eaLnBrk="1" latinLnBrk="0" hangingPunct="1">
         <a:lnSpc>
           <a:spcPct val="90000"/>
         </a:lnSpc>
@@ -3120,7 +3127,7 @@
           <a:spcPct val="0"/>
         </a:spcBef>
         <a:buNone/>
-        <a:defRPr sz="4400" kern="1200">
+        <a:defRPr sz="2783" kern="1200">
           <a:solidFill>
             <a:schemeClr val="tx1"/>
           </a:solidFill>
@@ -3131,16 +3138,16 @@
       </a:lvl1pPr>
     </p:titleStyle>
     <p:bodyStyle>
-      <a:lvl1pPr marL="228600" indent="-228600" algn="l" defTabSz="914400" rtl="0" eaLnBrk="1" latinLnBrk="0" hangingPunct="1">
+      <a:lvl1pPr marL="144612" indent="-144612" algn="l" defTabSz="578449" rtl="0" eaLnBrk="1" latinLnBrk="0" hangingPunct="1">
         <a:lnSpc>
           <a:spcPct val="90000"/>
         </a:lnSpc>
         <a:spcBef>
-          <a:spcPts val="1000"/>
+          <a:spcPts val="633"/>
         </a:spcBef>
         <a:buFont typeface="Arial" panose="020B0604020202020204" pitchFamily="34" charset="0"/>
         <a:buChar char="•"/>
-        <a:defRPr sz="2800" kern="1200">
+        <a:defRPr sz="1771" kern="1200">
           <a:solidFill>
             <a:schemeClr val="tx1"/>
           </a:solidFill>
@@ -3149,16 +3156,16 @@
           <a:cs typeface="+mn-cs"/>
         </a:defRPr>
       </a:lvl1pPr>
-      <a:lvl2pPr marL="685800" indent="-228600" algn="l" defTabSz="914400" rtl="0" eaLnBrk="1" latinLnBrk="0" hangingPunct="1">
+      <a:lvl2pPr marL="433837" indent="-144612" algn="l" defTabSz="578449" rtl="0" eaLnBrk="1" latinLnBrk="0" hangingPunct="1">
         <a:lnSpc>
           <a:spcPct val="90000"/>
         </a:lnSpc>
         <a:spcBef>
-          <a:spcPts val="500"/>
+          <a:spcPts val="316"/>
         </a:spcBef>
         <a:buFont typeface="Arial" panose="020B0604020202020204" pitchFamily="34" charset="0"/>
         <a:buChar char="•"/>
-        <a:defRPr sz="2400" kern="1200">
+        <a:defRPr sz="1518" kern="1200">
           <a:solidFill>
             <a:schemeClr val="tx1"/>
           </a:solidFill>
@@ -3167,16 +3174,16 @@
           <a:cs typeface="+mn-cs"/>
         </a:defRPr>
       </a:lvl2pPr>
-      <a:lvl3pPr marL="1143000" indent="-228600" algn="l" defTabSz="914400" rtl="0" eaLnBrk="1" latinLnBrk="0" hangingPunct="1">
+      <a:lvl3pPr marL="723062" indent="-144612" algn="l" defTabSz="578449" rtl="0" eaLnBrk="1" latinLnBrk="0" hangingPunct="1">
         <a:lnSpc>
           <a:spcPct val="90000"/>
         </a:lnSpc>
         <a:spcBef>
-          <a:spcPts val="500"/>
+          <a:spcPts val="316"/>
         </a:spcBef>
         <a:buFont typeface="Arial" panose="020B0604020202020204" pitchFamily="34" charset="0"/>
         <a:buChar char="•"/>
-        <a:defRPr sz="2000" kern="1200">
+        <a:defRPr sz="1265" kern="1200">
           <a:solidFill>
             <a:schemeClr val="tx1"/>
           </a:solidFill>
@@ -3185,16 +3192,16 @@
           <a:cs typeface="+mn-cs"/>
         </a:defRPr>
       </a:lvl3pPr>
-      <a:lvl4pPr marL="1600200" indent="-228600" algn="l" defTabSz="914400" rtl="0" eaLnBrk="1" latinLnBrk="0" hangingPunct="1">
+      <a:lvl4pPr marL="1012287" indent="-144612" algn="l" defTabSz="578449" rtl="0" eaLnBrk="1" latinLnBrk="0" hangingPunct="1">
         <a:lnSpc>
           <a:spcPct val="90000"/>
         </a:lnSpc>
         <a:spcBef>
-          <a:spcPts val="500"/>
+          <a:spcPts val="316"/>
         </a:spcBef>
         <a:buFont typeface="Arial" panose="020B0604020202020204" pitchFamily="34" charset="0"/>
         <a:buChar char="•"/>
-        <a:defRPr sz="1800" kern="1200">
+        <a:defRPr sz="1139" kern="1200">
           <a:solidFill>
             <a:schemeClr val="tx1"/>
           </a:solidFill>
@@ -3203,16 +3210,16 @@
           <a:cs typeface="+mn-cs"/>
         </a:defRPr>
       </a:lvl4pPr>
-      <a:lvl5pPr marL="2057400" indent="-228600" algn="l" defTabSz="914400" rtl="0" eaLnBrk="1" latinLnBrk="0" hangingPunct="1">
+      <a:lvl5pPr marL="1301511" indent="-144612" algn="l" defTabSz="578449" rtl="0" eaLnBrk="1" latinLnBrk="0" hangingPunct="1">
         <a:lnSpc>
           <a:spcPct val="90000"/>
         </a:lnSpc>
         <a:spcBef>
-          <a:spcPts val="500"/>
+          <a:spcPts val="316"/>
         </a:spcBef>
         <a:buFont typeface="Arial" panose="020B0604020202020204" pitchFamily="34" charset="0"/>
         <a:buChar char="•"/>
-        <a:defRPr sz="1800" kern="1200">
+        <a:defRPr sz="1139" kern="1200">
           <a:solidFill>
             <a:schemeClr val="tx1"/>
           </a:solidFill>
@@ -3221,16 +3228,16 @@
           <a:cs typeface="+mn-cs"/>
         </a:defRPr>
       </a:lvl5pPr>
-      <a:lvl6pPr marL="2514600" indent="-228600" algn="l" defTabSz="914400" rtl="0" eaLnBrk="1" latinLnBrk="0" hangingPunct="1">
+      <a:lvl6pPr marL="1590736" indent="-144612" algn="l" defTabSz="578449" rtl="0" eaLnBrk="1" latinLnBrk="0" hangingPunct="1">
         <a:lnSpc>
           <a:spcPct val="90000"/>
         </a:lnSpc>
         <a:spcBef>
-          <a:spcPts val="500"/>
+          <a:spcPts val="316"/>
         </a:spcBef>
         <a:buFont typeface="Arial" panose="020B0604020202020204" pitchFamily="34" charset="0"/>
         <a:buChar char="•"/>
-        <a:defRPr sz="1800" kern="1200">
+        <a:defRPr sz="1139" kern="1200">
           <a:solidFill>
             <a:schemeClr val="tx1"/>
           </a:solidFill>
@@ -3239,16 +3246,16 @@
           <a:cs typeface="+mn-cs"/>
         </a:defRPr>
       </a:lvl6pPr>
-      <a:lvl7pPr marL="2971800" indent="-228600" algn="l" defTabSz="914400" rtl="0" eaLnBrk="1" latinLnBrk="0" hangingPunct="1">
+      <a:lvl7pPr marL="1879961" indent="-144612" algn="l" defTabSz="578449" rtl="0" eaLnBrk="1" latinLnBrk="0" hangingPunct="1">
         <a:lnSpc>
           <a:spcPct val="90000"/>
         </a:lnSpc>
         <a:spcBef>
-          <a:spcPts val="500"/>
+          <a:spcPts val="316"/>
         </a:spcBef>
         <a:buFont typeface="Arial" panose="020B0604020202020204" pitchFamily="34" charset="0"/>
         <a:buChar char="•"/>
-        <a:defRPr sz="1800" kern="1200">
+        <a:defRPr sz="1139" kern="1200">
           <a:solidFill>
             <a:schemeClr val="tx1"/>
           </a:solidFill>
@@ -3257,16 +3264,16 @@
           <a:cs typeface="+mn-cs"/>
         </a:defRPr>
       </a:lvl7pPr>
-      <a:lvl8pPr marL="3429000" indent="-228600" algn="l" defTabSz="914400" rtl="0" eaLnBrk="1" latinLnBrk="0" hangingPunct="1">
+      <a:lvl8pPr marL="2169185" indent="-144612" algn="l" defTabSz="578449" rtl="0" eaLnBrk="1" latinLnBrk="0" hangingPunct="1">
         <a:lnSpc>
           <a:spcPct val="90000"/>
         </a:lnSpc>
         <a:spcBef>
-          <a:spcPts val="500"/>
+          <a:spcPts val="316"/>
         </a:spcBef>
         <a:buFont typeface="Arial" panose="020B0604020202020204" pitchFamily="34" charset="0"/>
         <a:buChar char="•"/>
-        <a:defRPr sz="1800" kern="1200">
+        <a:defRPr sz="1139" kern="1200">
           <a:solidFill>
             <a:schemeClr val="tx1"/>
           </a:solidFill>
@@ -3275,16 +3282,16 @@
           <a:cs typeface="+mn-cs"/>
         </a:defRPr>
       </a:lvl8pPr>
-      <a:lvl9pPr marL="3886200" indent="-228600" algn="l" defTabSz="914400" rtl="0" eaLnBrk="1" latinLnBrk="0" hangingPunct="1">
+      <a:lvl9pPr marL="2458410" indent="-144612" algn="l" defTabSz="578449" rtl="0" eaLnBrk="1" latinLnBrk="0" hangingPunct="1">
         <a:lnSpc>
           <a:spcPct val="90000"/>
         </a:lnSpc>
         <a:spcBef>
-          <a:spcPts val="500"/>
+          <a:spcPts val="316"/>
         </a:spcBef>
         <a:buFont typeface="Arial" panose="020B0604020202020204" pitchFamily="34" charset="0"/>
         <a:buChar char="•"/>
-        <a:defRPr sz="1800" kern="1200">
+        <a:defRPr sz="1139" kern="1200">
           <a:solidFill>
             <a:schemeClr val="tx1"/>
           </a:solidFill>
@@ -3298,8 +3305,8 @@
       <a:defPPr>
         <a:defRPr lang="en-US"/>
       </a:defPPr>
-      <a:lvl1pPr marL="0" algn="l" defTabSz="914400" rtl="0" eaLnBrk="1" latinLnBrk="0" hangingPunct="1">
-        <a:defRPr sz="1800" kern="1200">
+      <a:lvl1pPr marL="0" algn="l" defTabSz="578449" rtl="0" eaLnBrk="1" latinLnBrk="0" hangingPunct="1">
+        <a:defRPr sz="1139" kern="1200">
           <a:solidFill>
             <a:schemeClr val="tx1"/>
           </a:solidFill>
@@ -3308,8 +3315,8 @@
           <a:cs typeface="+mn-cs"/>
         </a:defRPr>
       </a:lvl1pPr>
-      <a:lvl2pPr marL="457200" algn="l" defTabSz="914400" rtl="0" eaLnBrk="1" latinLnBrk="0" hangingPunct="1">
-        <a:defRPr sz="1800" kern="1200">
+      <a:lvl2pPr marL="289225" algn="l" defTabSz="578449" rtl="0" eaLnBrk="1" latinLnBrk="0" hangingPunct="1">
+        <a:defRPr sz="1139" kern="1200">
           <a:solidFill>
             <a:schemeClr val="tx1"/>
           </a:solidFill>
@@ -3318,8 +3325,8 @@
           <a:cs typeface="+mn-cs"/>
         </a:defRPr>
       </a:lvl2pPr>
-      <a:lvl3pPr marL="914400" algn="l" defTabSz="914400" rtl="0" eaLnBrk="1" latinLnBrk="0" hangingPunct="1">
-        <a:defRPr sz="1800" kern="1200">
+      <a:lvl3pPr marL="578449" algn="l" defTabSz="578449" rtl="0" eaLnBrk="1" latinLnBrk="0" hangingPunct="1">
+        <a:defRPr sz="1139" kern="1200">
           <a:solidFill>
             <a:schemeClr val="tx1"/>
           </a:solidFill>
@@ -3328,8 +3335,8 @@
           <a:cs typeface="+mn-cs"/>
         </a:defRPr>
       </a:lvl3pPr>
-      <a:lvl4pPr marL="1371600" algn="l" defTabSz="914400" rtl="0" eaLnBrk="1" latinLnBrk="0" hangingPunct="1">
-        <a:defRPr sz="1800" kern="1200">
+      <a:lvl4pPr marL="867674" algn="l" defTabSz="578449" rtl="0" eaLnBrk="1" latinLnBrk="0" hangingPunct="1">
+        <a:defRPr sz="1139" kern="1200">
           <a:solidFill>
             <a:schemeClr val="tx1"/>
           </a:solidFill>
@@ -3338,8 +3345,8 @@
           <a:cs typeface="+mn-cs"/>
         </a:defRPr>
       </a:lvl4pPr>
-      <a:lvl5pPr marL="1828800" algn="l" defTabSz="914400" rtl="0" eaLnBrk="1" latinLnBrk="0" hangingPunct="1">
-        <a:defRPr sz="1800" kern="1200">
+      <a:lvl5pPr marL="1156899" algn="l" defTabSz="578449" rtl="0" eaLnBrk="1" latinLnBrk="0" hangingPunct="1">
+        <a:defRPr sz="1139" kern="1200">
           <a:solidFill>
             <a:schemeClr val="tx1"/>
           </a:solidFill>
@@ -3348,8 +3355,8 @@
           <a:cs typeface="+mn-cs"/>
         </a:defRPr>
       </a:lvl5pPr>
-      <a:lvl6pPr marL="2286000" algn="l" defTabSz="914400" rtl="0" eaLnBrk="1" latinLnBrk="0" hangingPunct="1">
-        <a:defRPr sz="1800" kern="1200">
+      <a:lvl6pPr marL="1446124" algn="l" defTabSz="578449" rtl="0" eaLnBrk="1" latinLnBrk="0" hangingPunct="1">
+        <a:defRPr sz="1139" kern="1200">
           <a:solidFill>
             <a:schemeClr val="tx1"/>
           </a:solidFill>
@@ -3358,8 +3365,8 @@
           <a:cs typeface="+mn-cs"/>
         </a:defRPr>
       </a:lvl6pPr>
-      <a:lvl7pPr marL="2743200" algn="l" defTabSz="914400" rtl="0" eaLnBrk="1" latinLnBrk="0" hangingPunct="1">
-        <a:defRPr sz="1800" kern="1200">
+      <a:lvl7pPr marL="1735348" algn="l" defTabSz="578449" rtl="0" eaLnBrk="1" latinLnBrk="0" hangingPunct="1">
+        <a:defRPr sz="1139" kern="1200">
           <a:solidFill>
             <a:schemeClr val="tx1"/>
           </a:solidFill>
@@ -3368,8 +3375,8 @@
           <a:cs typeface="+mn-cs"/>
         </a:defRPr>
       </a:lvl7pPr>
-      <a:lvl8pPr marL="3200400" algn="l" defTabSz="914400" rtl="0" eaLnBrk="1" latinLnBrk="0" hangingPunct="1">
-        <a:defRPr sz="1800" kern="1200">
+      <a:lvl8pPr marL="2024573" algn="l" defTabSz="578449" rtl="0" eaLnBrk="1" latinLnBrk="0" hangingPunct="1">
+        <a:defRPr sz="1139" kern="1200">
           <a:solidFill>
             <a:schemeClr val="tx1"/>
           </a:solidFill>
@@ -3378,8 +3385,8 @@
           <a:cs typeface="+mn-cs"/>
         </a:defRPr>
       </a:lvl8pPr>
-      <a:lvl9pPr marL="3657600" algn="l" defTabSz="914400" rtl="0" eaLnBrk="1" latinLnBrk="0" hangingPunct="1">
-        <a:defRPr sz="1800" kern="1200">
+      <a:lvl9pPr marL="2313798" algn="l" defTabSz="578449" rtl="0" eaLnBrk="1" latinLnBrk="0" hangingPunct="1">
+        <a:defRPr sz="1139" kern="1200">
           <a:solidFill>
             <a:schemeClr val="tx1"/>
           </a:solidFill>
@@ -3418,12 +3425,86 @@
           <a:chExt cx="0" cy="0"/>
         </a:xfrm>
       </p:grpSpPr>
+      <p:sp>
+        <p:nvSpPr>
+          <p:cNvPr id="8" name="TextBox 7">
+            <a:extLst>
+              <a:ext uri="{FF2B5EF4-FFF2-40B4-BE49-F238E27FC236}">
+                <a16:creationId xmlns:a16="http://schemas.microsoft.com/office/drawing/2014/main" id="{37338363-95AF-8F4C-8470-7EC91AFF8A88}"/>
+              </a:ext>
+            </a:extLst>
+          </p:cNvPr>
+          <p:cNvSpPr txBox="1"/>
+          <p:nvPr/>
+        </p:nvSpPr>
+        <p:spPr>
+          <a:xfrm>
+            <a:off x="619432" y="259403"/>
+            <a:ext cx="287258" cy="369332"/>
+          </a:xfrm>
+          <a:prstGeom prst="rect">
+            <a:avLst/>
+          </a:prstGeom>
+          <a:noFill/>
+        </p:spPr>
+        <p:txBody>
+          <a:bodyPr wrap="none" rtlCol="0">
+            <a:spAutoFit/>
+          </a:bodyPr>
+          <a:lstStyle/>
+          <a:p>
+            <a:r>
+              <a:rPr lang="en-US" dirty="0">
+                <a:latin typeface="Times" pitchFamily="2" charset="0"/>
+              </a:rPr>
+              <a:t>a</a:t>
+            </a:r>
+          </a:p>
+        </p:txBody>
+      </p:sp>
+      <p:sp>
+        <p:nvSpPr>
+          <p:cNvPr id="9" name="TextBox 8">
+            <a:extLst>
+              <a:ext uri="{FF2B5EF4-FFF2-40B4-BE49-F238E27FC236}">
+                <a16:creationId xmlns:a16="http://schemas.microsoft.com/office/drawing/2014/main" id="{296DB00F-0E8D-554D-A765-2201D06F9597}"/>
+              </a:ext>
+            </a:extLst>
+          </p:cNvPr>
+          <p:cNvSpPr txBox="1"/>
+          <p:nvPr/>
+        </p:nvSpPr>
+        <p:spPr>
+          <a:xfrm>
+            <a:off x="4650390" y="205692"/>
+            <a:ext cx="300082" cy="369332"/>
+          </a:xfrm>
+          <a:prstGeom prst="rect">
+            <a:avLst/>
+          </a:prstGeom>
+          <a:noFill/>
+        </p:spPr>
+        <p:txBody>
+          <a:bodyPr wrap="none" rtlCol="0">
+            <a:spAutoFit/>
+          </a:bodyPr>
+          <a:lstStyle/>
+          <a:p>
+            <a:r>
+              <a:rPr lang="en-US" dirty="0">
+                <a:latin typeface="Times" pitchFamily="2" charset="0"/>
+              </a:rPr>
+              <a:t>b</a:t>
+            </a:r>
+          </a:p>
+        </p:txBody>
+      </p:sp>
       <p:pic>
         <p:nvPicPr>
-          <p:cNvPr id="5" name="Picture 4">
+          <p:cNvPr id="3" name="Picture 2">
             <a:extLst>
               <a:ext uri="{FF2B5EF4-FFF2-40B4-BE49-F238E27FC236}">
-                <a16:creationId xmlns:a16="http://schemas.microsoft.com/office/drawing/2014/main" id="{C5B7A2F9-0203-3F40-9A37-00D2FB56AEFE}"/>
+                <a16:creationId xmlns:a16="http://schemas.microsoft.com/office/drawing/2014/main" id="{150D715D-C8E4-6E40-8A63-70FB17FD12B2}"/>
               </a:ext>
             </a:extLst>
           </p:cNvPr>
@@ -3432,15 +3513,15 @@
           </p:cNvPicPr>
           <p:nvPr/>
         </p:nvPicPr>
-        <p:blipFill rotWithShape="1">
+        <p:blipFill>
           <a:blip r:embed="rId3"/>
-          <a:srcRect r="16284"/>
+          <a:srcRect/>
           <a:stretch/>
         </p:blipFill>
         <p:spPr>
           <a:xfrm>
-            <a:off x="217129" y="1834706"/>
-            <a:ext cx="4004045" cy="3188587"/>
+            <a:off x="167593" y="575025"/>
+            <a:ext cx="4777856" cy="3185237"/>
           </a:xfrm>
           <a:prstGeom prst="rect">
             <a:avLst/>
@@ -3449,10 +3530,10 @@
       </p:pic>
       <p:pic>
         <p:nvPicPr>
-          <p:cNvPr id="7" name="Picture 6">
+          <p:cNvPr id="6" name="Picture 5">
             <a:extLst>
               <a:ext uri="{FF2B5EF4-FFF2-40B4-BE49-F238E27FC236}">
-                <a16:creationId xmlns:a16="http://schemas.microsoft.com/office/drawing/2014/main" id="{770C937C-054F-2D41-8346-D85800A7C5A6}"/>
+                <a16:creationId xmlns:a16="http://schemas.microsoft.com/office/drawing/2014/main" id="{6B00902A-BBA8-F14B-B19E-F64132BF516D}"/>
               </a:ext>
             </a:extLst>
           </p:cNvPr>
@@ -3463,94 +3544,19 @@
         </p:nvPicPr>
         <p:blipFill>
           <a:blip r:embed="rId4"/>
-          <a:stretch>
-            <a:fillRect/>
-          </a:stretch>
+          <a:srcRect/>
+          <a:stretch/>
         </p:blipFill>
         <p:spPr>
           <a:xfrm>
-            <a:off x="4221174" y="1834706"/>
-            <a:ext cx="4782879" cy="3188586"/>
+            <a:off x="4198552" y="575025"/>
+            <a:ext cx="4777855" cy="3185237"/>
           </a:xfrm>
           <a:prstGeom prst="rect">
             <a:avLst/>
           </a:prstGeom>
         </p:spPr>
       </p:pic>
-      <p:sp>
-        <p:nvSpPr>
-          <p:cNvPr id="8" name="TextBox 7">
-            <a:extLst>
-              <a:ext uri="{FF2B5EF4-FFF2-40B4-BE49-F238E27FC236}">
-                <a16:creationId xmlns:a16="http://schemas.microsoft.com/office/drawing/2014/main" id="{37338363-95AF-8F4C-8470-7EC91AFF8A88}"/>
-              </a:ext>
-            </a:extLst>
-          </p:cNvPr>
-          <p:cNvSpPr txBox="1"/>
-          <p:nvPr/>
-        </p:nvSpPr>
-        <p:spPr>
-          <a:xfrm>
-            <a:off x="619432" y="1519084"/>
-            <a:ext cx="287258" cy="369332"/>
-          </a:xfrm>
-          <a:prstGeom prst="rect">
-            <a:avLst/>
-          </a:prstGeom>
-          <a:noFill/>
-        </p:spPr>
-        <p:txBody>
-          <a:bodyPr wrap="none" rtlCol="0">
-            <a:spAutoFit/>
-          </a:bodyPr>
-          <a:lstStyle/>
-          <a:p>
-            <a:r>
-              <a:rPr lang="en-US" dirty="0">
-                <a:latin typeface="Times" pitchFamily="2" charset="0"/>
-              </a:rPr>
-              <a:t>a</a:t>
-            </a:r>
-          </a:p>
-        </p:txBody>
-      </p:sp>
-      <p:sp>
-        <p:nvSpPr>
-          <p:cNvPr id="9" name="TextBox 8">
-            <a:extLst>
-              <a:ext uri="{FF2B5EF4-FFF2-40B4-BE49-F238E27FC236}">
-                <a16:creationId xmlns:a16="http://schemas.microsoft.com/office/drawing/2014/main" id="{296DB00F-0E8D-554D-A765-2201D06F9597}"/>
-              </a:ext>
-            </a:extLst>
-          </p:cNvPr>
-          <p:cNvSpPr txBox="1"/>
-          <p:nvPr/>
-        </p:nvSpPr>
-        <p:spPr>
-          <a:xfrm>
-            <a:off x="4650390" y="1465373"/>
-            <a:ext cx="300082" cy="369332"/>
-          </a:xfrm>
-          <a:prstGeom prst="rect">
-            <a:avLst/>
-          </a:prstGeom>
-          <a:noFill/>
-        </p:spPr>
-        <p:txBody>
-          <a:bodyPr wrap="none" rtlCol="0">
-            <a:spAutoFit/>
-          </a:bodyPr>
-          <a:lstStyle/>
-          <a:p>
-            <a:r>
-              <a:rPr lang="en-US" dirty="0">
-                <a:latin typeface="Times" pitchFamily="2" charset="0"/>
-              </a:rPr>
-              <a:t>b</a:t>
-            </a:r>
-          </a:p>
-        </p:txBody>
-      </p:sp>
     </p:spTree>
     <p:extLst>
       <p:ext uri="{BB962C8B-B14F-4D97-AF65-F5344CB8AC3E}">

</xml_diff>